<commit_message>
[Engineering PPT] add draft version 2017-webpack.pptx and outline
</commit_message>
<xml_diff>
--- a/engineering/2017/Webpack.pptx
+++ b/engineering/2017/Webpack.pptx
@@ -5,20 +5,21 @@
     <p:sldMasterId id="2147483648" r:id="rId1"/>
   </p:sldMasterIdLst>
   <p:notesMasterIdLst>
-    <p:notesMasterId r:id="rId13"/>
+    <p:notesMasterId r:id="rId14"/>
   </p:notesMasterIdLst>
   <p:sldIdLst>
     <p:sldId id="256" r:id="rId2"/>
     <p:sldId id="257" r:id="rId3"/>
     <p:sldId id="258" r:id="rId4"/>
     <p:sldId id="259" r:id="rId5"/>
-    <p:sldId id="269" r:id="rId6"/>
-    <p:sldId id="270" r:id="rId7"/>
-    <p:sldId id="260" r:id="rId8"/>
-    <p:sldId id="267" r:id="rId9"/>
-    <p:sldId id="271" r:id="rId10"/>
-    <p:sldId id="272" r:id="rId11"/>
-    <p:sldId id="268" r:id="rId12"/>
+    <p:sldId id="273" r:id="rId6"/>
+    <p:sldId id="269" r:id="rId7"/>
+    <p:sldId id="270" r:id="rId8"/>
+    <p:sldId id="260" r:id="rId9"/>
+    <p:sldId id="267" r:id="rId10"/>
+    <p:sldId id="271" r:id="rId11"/>
+    <p:sldId id="272" r:id="rId12"/>
+    <p:sldId id="268" r:id="rId13"/>
   </p:sldIdLst>
   <p:sldSz cx="12192000" cy="6858000"/>
   <p:notesSz cx="6858000" cy="9144000"/>
@@ -1478,19 +1479,105 @@
           <a:p>
             <a:r>
               <a:rPr lang="zh-CN" altLang="en-US" dirty="0"/>
-              <a:t>小插曲之</a:t>
+              <a:t>插曲</a:t>
             </a:r>
             <a:r>
               <a:rPr lang="en-US" altLang="zh-CN" dirty="0"/>
-              <a:t>DEMO</a:t>
+              <a:t>:</a:t>
+            </a:r>
+          </a:p>
+          <a:p>
+            <a:r>
+              <a:rPr lang="zh-CN" altLang="en-US" dirty="0"/>
+              <a:t>列出市场上流行</a:t>
+            </a:r>
+            <a:r>
+              <a:rPr lang="zh-CN" altLang="en-US" baseline="0" dirty="0"/>
+              <a:t>的</a:t>
             </a:r>
             <a:r>
               <a:rPr lang="en-US" altLang="zh-CN" baseline="0" dirty="0"/>
-              <a:t>: </a:t>
+              <a:t>JavaScript </a:t>
             </a:r>
             <a:r>
               <a:rPr lang="zh-CN" altLang="en-US" baseline="0" dirty="0"/>
-              <a:t>如果同学们都了解则可跳过</a:t>
+              <a:t>构建工具</a:t>
+            </a:r>
+            <a:r>
+              <a:rPr lang="en-US" altLang="zh-CN" baseline="0" dirty="0"/>
+              <a:t>(</a:t>
+            </a:r>
+            <a:r>
+              <a:rPr lang="zh-CN" altLang="en-US" baseline="0" dirty="0"/>
+              <a:t>无论前端后端</a:t>
+            </a:r>
+            <a:r>
+              <a:rPr lang="en-US" altLang="zh-CN" baseline="0" dirty="0"/>
+              <a:t>)</a:t>
+            </a:r>
+          </a:p>
+          <a:p>
+            <a:endParaRPr lang="en-US" baseline="0" dirty="0"/>
+          </a:p>
+          <a:p>
+            <a:r>
+              <a:rPr lang="en-US" b="1" dirty="0" err="1"/>
+              <a:t>Webpack</a:t>
+            </a:r>
+            <a:endParaRPr lang="en-US" b="1" dirty="0"/>
+          </a:p>
+          <a:p>
+            <a:r>
+              <a:rPr lang="en-US" b="1" dirty="0" err="1"/>
+              <a:t>Requirejs</a:t>
+            </a:r>
+            <a:endParaRPr lang="en-US" b="1" dirty="0"/>
+          </a:p>
+          <a:p>
+            <a:r>
+              <a:rPr lang="en-US" b="1" dirty="0" err="1"/>
+              <a:t>Browserify</a:t>
+            </a:r>
+            <a:endParaRPr lang="en-US" b="1" dirty="0"/>
+          </a:p>
+          <a:p>
+            <a:r>
+              <a:rPr lang="en-US" b="1" dirty="0"/>
+              <a:t>Rollup</a:t>
+            </a:r>
+          </a:p>
+          <a:p>
+            <a:r>
+              <a:rPr lang="en-US" b="1" dirty="0"/>
+              <a:t>Brunch</a:t>
+            </a:r>
+          </a:p>
+          <a:p>
+            <a:r>
+              <a:rPr lang="en-US" b="1" dirty="0"/>
+              <a:t>P</a:t>
+            </a:r>
+            <a:r>
+              <a:rPr lang="en-US" altLang="zh-CN" b="1" dirty="0"/>
+              <a:t>repack</a:t>
+            </a:r>
+            <a:endParaRPr lang="en-US" dirty="0"/>
+          </a:p>
+          <a:p>
+            <a:endParaRPr lang="en-US" dirty="0"/>
+          </a:p>
+          <a:p>
+            <a:r>
+              <a:rPr lang="en-US" altLang="zh-CN" dirty="0"/>
+              <a:t>(FIS)</a:t>
+            </a:r>
+            <a:r>
+              <a:rPr lang="en-US" altLang="zh-CN" baseline="0" dirty="0"/>
+              <a:t> </a:t>
+            </a:r>
+            <a:r>
+              <a:rPr lang="zh-CN" altLang="en-US" baseline="0" dirty="0"/>
+              <a:t>需要提及他么</a:t>
             </a:r>
             <a:endParaRPr lang="en-US" dirty="0"/>
           </a:p>
@@ -1522,7 +1609,7 @@
     </p:spTree>
     <p:extLst>
       <p:ext uri="{BB962C8B-B14F-4D97-AF65-F5344CB8AC3E}">
-        <p14:creationId xmlns:p14="http://schemas.microsoft.com/office/powerpoint/2010/main" val="835402319"/>
+        <p14:creationId xmlns:p14="http://schemas.microsoft.com/office/powerpoint/2010/main" val="3781380215"/>
       </p:ext>
     </p:extLst>
   </p:cSld>
@@ -1578,69 +1665,21 @@
           <a:p>
             <a:r>
               <a:rPr lang="zh-CN" altLang="en-US" dirty="0"/>
-              <a:t>举个例子</a:t>
-            </a:r>
-            <a:endParaRPr lang="en-US" altLang="zh-CN" dirty="0"/>
-          </a:p>
-          <a:p>
-            <a:r>
-              <a:rPr lang="en-US" dirty="0"/>
-              <a:t>1</a:t>
+              <a:t>小插曲之</a:t>
             </a:r>
             <a:r>
               <a:rPr lang="en-US" altLang="zh-CN" dirty="0"/>
-              <a:t>.Copy</a:t>
-            </a:r>
-            <a:r>
-              <a:rPr lang="zh-CN" altLang="en-US" dirty="0"/>
-              <a:t>代码</a:t>
-            </a:r>
-            <a:r>
-              <a:rPr lang="en-US" altLang="zh-CN" dirty="0"/>
-              <a:t>,</a:t>
-            </a:r>
-            <a:r>
-              <a:rPr lang="zh-CN" altLang="en-US" dirty="0"/>
-              <a:t>安装依赖</a:t>
-            </a:r>
-            <a:endParaRPr lang="en-US" altLang="zh-CN" dirty="0"/>
-          </a:p>
-          <a:p>
-            <a:r>
-              <a:rPr lang="en-US" altLang="zh-CN" dirty="0"/>
-              <a:t>2.</a:t>
-            </a:r>
-            <a:r>
-              <a:rPr lang="zh-CN" altLang="en-US" dirty="0"/>
-              <a:t>先运行</a:t>
-            </a:r>
-            <a:r>
-              <a:rPr lang="en-US" altLang="zh-CN" dirty="0"/>
-              <a:t>,</a:t>
-            </a:r>
-            <a:r>
-              <a:rPr lang="zh-CN" altLang="en-US" dirty="0"/>
-              <a:t>看看效果</a:t>
-            </a:r>
-            <a:endParaRPr lang="en-US" altLang="zh-CN" dirty="0"/>
-          </a:p>
-          <a:p>
-            <a:r>
-              <a:rPr lang="en-US" altLang="zh-CN" dirty="0"/>
-              <a:t>3.</a:t>
-            </a:r>
-            <a:r>
-              <a:rPr lang="zh-CN" altLang="en-US" dirty="0"/>
-              <a:t>逐个文件解释</a:t>
-            </a:r>
-            <a:endParaRPr lang="en-US" altLang="zh-CN" dirty="0"/>
-          </a:p>
-          <a:p>
-            <a:pPr marL="0" indent="0">
-              <a:buFontTx/>
-              <a:buNone/>
-            </a:pPr>
-            <a:endParaRPr lang="en-US" altLang="zh-CN" dirty="0"/>
+              <a:t>DEMO</a:t>
+            </a:r>
+            <a:r>
+              <a:rPr lang="en-US" altLang="zh-CN" baseline="0" dirty="0"/>
+              <a:t>: </a:t>
+            </a:r>
+            <a:r>
+              <a:rPr lang="zh-CN" altLang="en-US" baseline="0" dirty="0"/>
+              <a:t>如果同学们都了解则可跳过</a:t>
+            </a:r>
+            <a:endParaRPr lang="en-US" dirty="0"/>
           </a:p>
         </p:txBody>
       </p:sp>
@@ -1670,7 +1709,7 @@
     </p:spTree>
     <p:extLst>
       <p:ext uri="{BB962C8B-B14F-4D97-AF65-F5344CB8AC3E}">
-        <p14:creationId xmlns:p14="http://schemas.microsoft.com/office/powerpoint/2010/main" val="1085906707"/>
+        <p14:creationId xmlns:p14="http://schemas.microsoft.com/office/powerpoint/2010/main" val="835402319"/>
       </p:ext>
     </p:extLst>
   </p:cSld>
@@ -1725,6 +1764,154 @@
           <a:lstStyle/>
           <a:p>
             <a:r>
+              <a:rPr lang="zh-CN" altLang="en-US" dirty="0"/>
+              <a:t>举个例子</a:t>
+            </a:r>
+            <a:endParaRPr lang="en-US" altLang="zh-CN" dirty="0"/>
+          </a:p>
+          <a:p>
+            <a:r>
+              <a:rPr lang="en-US" dirty="0"/>
+              <a:t>1</a:t>
+            </a:r>
+            <a:r>
+              <a:rPr lang="en-US" altLang="zh-CN" dirty="0"/>
+              <a:t>.Copy</a:t>
+            </a:r>
+            <a:r>
+              <a:rPr lang="zh-CN" altLang="en-US" dirty="0"/>
+              <a:t>代码</a:t>
+            </a:r>
+            <a:r>
+              <a:rPr lang="en-US" altLang="zh-CN" dirty="0"/>
+              <a:t>,</a:t>
+            </a:r>
+            <a:r>
+              <a:rPr lang="zh-CN" altLang="en-US" dirty="0"/>
+              <a:t>安装依赖</a:t>
+            </a:r>
+            <a:endParaRPr lang="en-US" altLang="zh-CN" dirty="0"/>
+          </a:p>
+          <a:p>
+            <a:r>
+              <a:rPr lang="en-US" altLang="zh-CN" dirty="0"/>
+              <a:t>2.</a:t>
+            </a:r>
+            <a:r>
+              <a:rPr lang="zh-CN" altLang="en-US" dirty="0"/>
+              <a:t>先运行</a:t>
+            </a:r>
+            <a:r>
+              <a:rPr lang="en-US" altLang="zh-CN" dirty="0"/>
+              <a:t>,</a:t>
+            </a:r>
+            <a:r>
+              <a:rPr lang="zh-CN" altLang="en-US" dirty="0"/>
+              <a:t>看看效果</a:t>
+            </a:r>
+            <a:endParaRPr lang="en-US" altLang="zh-CN" dirty="0"/>
+          </a:p>
+          <a:p>
+            <a:r>
+              <a:rPr lang="en-US" altLang="zh-CN" dirty="0"/>
+              <a:t>3.</a:t>
+            </a:r>
+            <a:r>
+              <a:rPr lang="zh-CN" altLang="en-US" dirty="0"/>
+              <a:t>逐个文件解释</a:t>
+            </a:r>
+            <a:endParaRPr lang="en-US" altLang="zh-CN" dirty="0"/>
+          </a:p>
+          <a:p>
+            <a:pPr marL="0" indent="0">
+              <a:buFontTx/>
+              <a:buNone/>
+            </a:pPr>
+            <a:endParaRPr lang="en-US" altLang="zh-CN" dirty="0"/>
+          </a:p>
+        </p:txBody>
+      </p:sp>
+      <p:sp>
+        <p:nvSpPr>
+          <p:cNvPr id="4" name="Slide Number Placeholder 3"/>
+          <p:cNvSpPr>
+            <a:spLocks noGrp="1"/>
+          </p:cNvSpPr>
+          <p:nvPr>
+            <p:ph type="sldNum" sz="quarter" idx="10"/>
+          </p:nvPr>
+        </p:nvSpPr>
+        <p:spPr/>
+        <p:txBody>
+          <a:bodyPr/>
+          <a:lstStyle/>
+          <a:p>
+            <a:fld id="{78879535-A25D-43F8-BBFC-6A8A6FA2529F}" type="slidenum">
+              <a:rPr lang="en-US" smtClean="0"/>
+              <a:t>7</a:t>
+            </a:fld>
+            <a:endParaRPr lang="en-US"/>
+          </a:p>
+        </p:txBody>
+      </p:sp>
+    </p:spTree>
+    <p:extLst>
+      <p:ext uri="{BB962C8B-B14F-4D97-AF65-F5344CB8AC3E}">
+        <p14:creationId xmlns:p14="http://schemas.microsoft.com/office/powerpoint/2010/main" val="1085906707"/>
+      </p:ext>
+    </p:extLst>
+  </p:cSld>
+  <p:clrMapOvr>
+    <a:masterClrMapping/>
+  </p:clrMapOvr>
+</p:notes>
+</file>
+
+<file path=ppt/notesSlides/notesSlide8.xml><?xml version="1.0" encoding="utf-8"?>
+<p:notes xmlns:a="http://schemas.openxmlformats.org/drawingml/2006/main" xmlns:r="http://schemas.openxmlformats.org/officeDocument/2006/relationships" xmlns:p="http://schemas.openxmlformats.org/presentationml/2006/main">
+  <p:cSld>
+    <p:spTree>
+      <p:nvGrpSpPr>
+        <p:cNvPr id="1" name=""/>
+        <p:cNvGrpSpPr/>
+        <p:nvPr/>
+      </p:nvGrpSpPr>
+      <p:grpSpPr>
+        <a:xfrm>
+          <a:off x="0" y="0"/>
+          <a:ext cx="0" cy="0"/>
+          <a:chOff x="0" y="0"/>
+          <a:chExt cx="0" cy="0"/>
+        </a:xfrm>
+      </p:grpSpPr>
+      <p:sp>
+        <p:nvSpPr>
+          <p:cNvPr id="2" name="Slide Image Placeholder 1"/>
+          <p:cNvSpPr>
+            <a:spLocks noGrp="1" noRot="1" noChangeAspect="1"/>
+          </p:cNvSpPr>
+          <p:nvPr>
+            <p:ph type="sldImg"/>
+          </p:nvPr>
+        </p:nvSpPr>
+        <p:spPr/>
+      </p:sp>
+      <p:sp>
+        <p:nvSpPr>
+          <p:cNvPr id="3" name="Notes Placeholder 2"/>
+          <p:cNvSpPr>
+            <a:spLocks noGrp="1"/>
+          </p:cNvSpPr>
+          <p:nvPr>
+            <p:ph type="body" idx="1"/>
+          </p:nvPr>
+        </p:nvSpPr>
+        <p:spPr/>
+        <p:txBody>
+          <a:bodyPr/>
+          <a:lstStyle/>
+          <a:p>
+            <a:r>
               <a:rPr lang="en-US" dirty="0"/>
               <a:t>C</a:t>
             </a:r>
@@ -2269,7 +2456,7 @@
           <a:p>
             <a:fld id="{78879535-A25D-43F8-BBFC-6A8A6FA2529F}" type="slidenum">
               <a:rPr lang="en-US" smtClean="0"/>
-              <a:t>7</a:t>
+              <a:t>8</a:t>
             </a:fld>
             <a:endParaRPr lang="en-US"/>
           </a:p>
@@ -5361,6 +5548,98 @@
                 <a:ea typeface="Roboto Light" panose="02000000000000000000" pitchFamily="2" charset="0"/>
                 <a:cs typeface="Roboto Light" panose="02000000000000000000" pitchFamily="2" charset="0"/>
               </a:rPr>
+              <a:t>P</a:t>
+            </a:r>
+            <a:r>
+              <a:rPr lang="en-US" altLang="zh-CN" dirty="0">
+                <a:latin typeface="Roboto Light" panose="02000000000000000000" pitchFamily="2" charset="0"/>
+                <a:ea typeface="Roboto Light" panose="02000000000000000000" pitchFamily="2" charset="0"/>
+                <a:cs typeface="Roboto Light" panose="02000000000000000000" pitchFamily="2" charset="0"/>
+              </a:rPr>
+              <a:t>lugins</a:t>
+            </a:r>
+            <a:endParaRPr lang="en-US" dirty="0">
+              <a:latin typeface="Roboto Light" panose="02000000000000000000" pitchFamily="2" charset="0"/>
+              <a:ea typeface="Roboto Light" panose="02000000000000000000" pitchFamily="2" charset="0"/>
+              <a:cs typeface="Roboto Light" panose="02000000000000000000" pitchFamily="2" charset="0"/>
+            </a:endParaRPr>
+          </a:p>
+        </p:txBody>
+      </p:sp>
+      <p:sp>
+        <p:nvSpPr>
+          <p:cNvPr id="3" name="Content Placeholder 2"/>
+          <p:cNvSpPr>
+            <a:spLocks noGrp="1"/>
+          </p:cNvSpPr>
+          <p:nvPr>
+            <p:ph idx="1"/>
+          </p:nvPr>
+        </p:nvSpPr>
+        <p:spPr/>
+        <p:txBody>
+          <a:bodyPr/>
+          <a:lstStyle/>
+          <a:p>
+            <a:endParaRPr lang="en-US" dirty="0">
+              <a:latin typeface="Roboto Light" panose="02000000000000000000" pitchFamily="2" charset="0"/>
+              <a:ea typeface="Roboto Light" panose="02000000000000000000" pitchFamily="2" charset="0"/>
+              <a:cs typeface="Roboto Light" panose="02000000000000000000" pitchFamily="2" charset="0"/>
+            </a:endParaRPr>
+          </a:p>
+        </p:txBody>
+      </p:sp>
+    </p:spTree>
+    <p:extLst>
+      <p:ext uri="{BB962C8B-B14F-4D97-AF65-F5344CB8AC3E}">
+        <p14:creationId xmlns:p14="http://schemas.microsoft.com/office/powerpoint/2010/main" val="1355787398"/>
+      </p:ext>
+    </p:extLst>
+  </p:cSld>
+  <p:clrMapOvr>
+    <a:masterClrMapping/>
+  </p:clrMapOvr>
+</p:sld>
+</file>
+
+<file path=ppt/slides/slide11.xml><?xml version="1.0" encoding="utf-8"?>
+<p:sld xmlns:a="http://schemas.openxmlformats.org/drawingml/2006/main" xmlns:r="http://schemas.openxmlformats.org/officeDocument/2006/relationships" xmlns:p="http://schemas.openxmlformats.org/presentationml/2006/main">
+  <p:cSld>
+    <p:spTree>
+      <p:nvGrpSpPr>
+        <p:cNvPr id="1" name=""/>
+        <p:cNvGrpSpPr/>
+        <p:nvPr/>
+      </p:nvGrpSpPr>
+      <p:grpSpPr>
+        <a:xfrm>
+          <a:off x="0" y="0"/>
+          <a:ext cx="0" cy="0"/>
+          <a:chOff x="0" y="0"/>
+          <a:chExt cx="0" cy="0"/>
+        </a:xfrm>
+      </p:grpSpPr>
+      <p:sp>
+        <p:nvSpPr>
+          <p:cNvPr id="2" name="Title 1"/>
+          <p:cNvSpPr>
+            <a:spLocks noGrp="1"/>
+          </p:cNvSpPr>
+          <p:nvPr>
+            <p:ph type="title"/>
+          </p:nvPr>
+        </p:nvSpPr>
+        <p:spPr/>
+        <p:txBody>
+          <a:bodyPr/>
+          <a:lstStyle/>
+          <a:p>
+            <a:r>
+              <a:rPr lang="en-US" dirty="0">
+                <a:latin typeface="Roboto Light" panose="02000000000000000000" pitchFamily="2" charset="0"/>
+                <a:ea typeface="Roboto Light" panose="02000000000000000000" pitchFamily="2" charset="0"/>
+                <a:cs typeface="Roboto Light" panose="02000000000000000000" pitchFamily="2" charset="0"/>
+              </a:rPr>
               <a:t>R</a:t>
             </a:r>
             <a:r>
@@ -5415,7 +5694,7 @@
 </p:sld>
 </file>
 
-<file path=ppt/slides/slide11.xml><?xml version="1.0" encoding="utf-8"?>
+<file path=ppt/slides/slide12.xml><?xml version="1.0" encoding="utf-8"?>
 <p:sld xmlns:a="http://schemas.openxmlformats.org/drawingml/2006/main" xmlns:r="http://schemas.openxmlformats.org/officeDocument/2006/relationships" xmlns:p="http://schemas.openxmlformats.org/presentationml/2006/main">
   <p:cSld>
     <p:spTree>
@@ -7228,6 +7507,130 @@
           <a:p>
             <a:r>
               <a:rPr lang="en-US" dirty="0"/>
+              <a:t>I</a:t>
+            </a:r>
+            <a:r>
+              <a:rPr lang="en-US" altLang="zh-CN" dirty="0"/>
+              <a:t>ntroduction</a:t>
+            </a:r>
+            <a:br>
+              <a:rPr lang="en-US" altLang="zh-CN" dirty="0"/>
+            </a:br>
+            <a:r>
+              <a:rPr lang="en-US" altLang="zh-CN" sz="2800" dirty="0"/>
+              <a:t>comparison</a:t>
+            </a:r>
+            <a:endParaRPr lang="en-US" dirty="0"/>
+          </a:p>
+        </p:txBody>
+      </p:sp>
+      <p:sp>
+        <p:nvSpPr>
+          <p:cNvPr id="3" name="Content Placeholder 2"/>
+          <p:cNvSpPr>
+            <a:spLocks noGrp="1"/>
+          </p:cNvSpPr>
+          <p:nvPr>
+            <p:ph idx="1"/>
+          </p:nvPr>
+        </p:nvSpPr>
+        <p:spPr/>
+        <p:txBody>
+          <a:bodyPr/>
+          <a:lstStyle/>
+          <a:p>
+            <a:r>
+              <a:rPr lang="en-US" b="1" dirty="0" err="1"/>
+              <a:t>Webpack</a:t>
+            </a:r>
+            <a:endParaRPr lang="en-US" b="1" dirty="0"/>
+          </a:p>
+          <a:p>
+            <a:r>
+              <a:rPr lang="en-US" b="1" dirty="0" err="1"/>
+              <a:t>Requirejs</a:t>
+            </a:r>
+            <a:endParaRPr lang="en-US" b="1" dirty="0"/>
+          </a:p>
+          <a:p>
+            <a:r>
+              <a:rPr lang="en-US" b="1" dirty="0" err="1"/>
+              <a:t>Browserify</a:t>
+            </a:r>
+            <a:endParaRPr lang="en-US" b="1" dirty="0"/>
+          </a:p>
+          <a:p>
+            <a:r>
+              <a:rPr lang="en-US" b="1" dirty="0"/>
+              <a:t>Rollup</a:t>
+            </a:r>
+          </a:p>
+          <a:p>
+            <a:r>
+              <a:rPr lang="en-US" b="1" dirty="0"/>
+              <a:t>Brunch</a:t>
+            </a:r>
+          </a:p>
+          <a:p>
+            <a:r>
+              <a:rPr lang="en-US" b="1" dirty="0"/>
+              <a:t>P</a:t>
+            </a:r>
+            <a:r>
+              <a:rPr lang="en-US" altLang="zh-CN" b="1" dirty="0"/>
+              <a:t>repack</a:t>
+            </a:r>
+            <a:endParaRPr lang="en-US" dirty="0"/>
+          </a:p>
+        </p:txBody>
+      </p:sp>
+    </p:spTree>
+    <p:extLst>
+      <p:ext uri="{BB962C8B-B14F-4D97-AF65-F5344CB8AC3E}">
+        <p14:creationId xmlns:p14="http://schemas.microsoft.com/office/powerpoint/2010/main" val="2198659561"/>
+      </p:ext>
+    </p:extLst>
+  </p:cSld>
+  <p:clrMapOvr>
+    <a:masterClrMapping/>
+  </p:clrMapOvr>
+</p:sld>
+</file>
+
+<file path=ppt/slides/slide6.xml><?xml version="1.0" encoding="utf-8"?>
+<p:sld xmlns:a="http://schemas.openxmlformats.org/drawingml/2006/main" xmlns:r="http://schemas.openxmlformats.org/officeDocument/2006/relationships" xmlns:p="http://schemas.openxmlformats.org/presentationml/2006/main">
+  <p:cSld>
+    <p:spTree>
+      <p:nvGrpSpPr>
+        <p:cNvPr id="1" name=""/>
+        <p:cNvGrpSpPr/>
+        <p:nvPr/>
+      </p:nvGrpSpPr>
+      <p:grpSpPr>
+        <a:xfrm>
+          <a:off x="0" y="0"/>
+          <a:ext cx="0" cy="0"/>
+          <a:chOff x="0" y="0"/>
+          <a:chExt cx="0" cy="0"/>
+        </a:xfrm>
+      </p:grpSpPr>
+      <p:sp>
+        <p:nvSpPr>
+          <p:cNvPr id="2" name="Title 1"/>
+          <p:cNvSpPr>
+            <a:spLocks noGrp="1"/>
+          </p:cNvSpPr>
+          <p:nvPr>
+            <p:ph type="title"/>
+          </p:nvPr>
+        </p:nvSpPr>
+        <p:spPr/>
+        <p:txBody>
+          <a:bodyPr/>
+          <a:lstStyle/>
+          <a:p>
+            <a:r>
+              <a:rPr lang="en-US" dirty="0"/>
               <a:t>G</a:t>
             </a:r>
             <a:r>
@@ -7300,7 +7703,7 @@
 </p:sld>
 </file>
 
-<file path=ppt/slides/slide6.xml><?xml version="1.0" encoding="utf-8"?>
+<file path=ppt/slides/slide7.xml><?xml version="1.0" encoding="utf-8"?>
 <p:sld xmlns:a="http://schemas.openxmlformats.org/drawingml/2006/main" xmlns:r="http://schemas.openxmlformats.org/officeDocument/2006/relationships" xmlns:p="http://schemas.openxmlformats.org/presentationml/2006/main">
   <p:cSld>
     <p:spTree>
@@ -7383,7 +7786,7 @@
 </p:sld>
 </file>
 
-<file path=ppt/slides/slide7.xml><?xml version="1.0" encoding="utf-8"?>
+<file path=ppt/slides/slide8.xml><?xml version="1.0" encoding="utf-8"?>
 <p:sld xmlns:a="http://schemas.openxmlformats.org/drawingml/2006/main" xmlns:r="http://schemas.openxmlformats.org/officeDocument/2006/relationships" xmlns:p="http://schemas.openxmlformats.org/presentationml/2006/main">
   <p:cSld>
     <p:spTree>
@@ -8135,98 +8538,6 @@
 </p:sld>
 </file>
 
-<file path=ppt/slides/slide8.xml><?xml version="1.0" encoding="utf-8"?>
-<p:sld xmlns:a="http://schemas.openxmlformats.org/drawingml/2006/main" xmlns:r="http://schemas.openxmlformats.org/officeDocument/2006/relationships" xmlns:p="http://schemas.openxmlformats.org/presentationml/2006/main">
-  <p:cSld>
-    <p:spTree>
-      <p:nvGrpSpPr>
-        <p:cNvPr id="1" name=""/>
-        <p:cNvGrpSpPr/>
-        <p:nvPr/>
-      </p:nvGrpSpPr>
-      <p:grpSpPr>
-        <a:xfrm>
-          <a:off x="0" y="0"/>
-          <a:ext cx="0" cy="0"/>
-          <a:chOff x="0" y="0"/>
-          <a:chExt cx="0" cy="0"/>
-        </a:xfrm>
-      </p:grpSpPr>
-      <p:sp>
-        <p:nvSpPr>
-          <p:cNvPr id="2" name="Title 1"/>
-          <p:cNvSpPr>
-            <a:spLocks noGrp="1"/>
-          </p:cNvSpPr>
-          <p:nvPr>
-            <p:ph type="title"/>
-          </p:nvPr>
-        </p:nvSpPr>
-        <p:spPr/>
-        <p:txBody>
-          <a:bodyPr/>
-          <a:lstStyle/>
-          <a:p>
-            <a:r>
-              <a:rPr lang="en-US" dirty="0">
-                <a:latin typeface="Roboto Light" panose="02000000000000000000" pitchFamily="2" charset="0"/>
-                <a:ea typeface="Roboto Light" panose="02000000000000000000" pitchFamily="2" charset="0"/>
-                <a:cs typeface="Roboto Light" panose="02000000000000000000" pitchFamily="2" charset="0"/>
-              </a:rPr>
-              <a:t>L</a:t>
-            </a:r>
-            <a:r>
-              <a:rPr lang="en-US" altLang="zh-CN" dirty="0">
-                <a:latin typeface="Roboto Light" panose="02000000000000000000" pitchFamily="2" charset="0"/>
-                <a:ea typeface="Roboto Light" panose="02000000000000000000" pitchFamily="2" charset="0"/>
-                <a:cs typeface="Roboto Light" panose="02000000000000000000" pitchFamily="2" charset="0"/>
-              </a:rPr>
-              <a:t>oaders</a:t>
-            </a:r>
-            <a:endParaRPr lang="en-US" dirty="0">
-              <a:latin typeface="Roboto Light" panose="02000000000000000000" pitchFamily="2" charset="0"/>
-              <a:ea typeface="Roboto Light" panose="02000000000000000000" pitchFamily="2" charset="0"/>
-              <a:cs typeface="Roboto Light" panose="02000000000000000000" pitchFamily="2" charset="0"/>
-            </a:endParaRPr>
-          </a:p>
-        </p:txBody>
-      </p:sp>
-      <p:sp>
-        <p:nvSpPr>
-          <p:cNvPr id="3" name="Content Placeholder 2"/>
-          <p:cNvSpPr>
-            <a:spLocks noGrp="1"/>
-          </p:cNvSpPr>
-          <p:nvPr>
-            <p:ph idx="1"/>
-          </p:nvPr>
-        </p:nvSpPr>
-        <p:spPr/>
-        <p:txBody>
-          <a:bodyPr/>
-          <a:lstStyle/>
-          <a:p>
-            <a:endParaRPr lang="en-US" dirty="0">
-              <a:latin typeface="Roboto Light" panose="02000000000000000000" pitchFamily="2" charset="0"/>
-              <a:ea typeface="Roboto Light" panose="02000000000000000000" pitchFamily="2" charset="0"/>
-              <a:cs typeface="Roboto Light" panose="02000000000000000000" pitchFamily="2" charset="0"/>
-            </a:endParaRPr>
-          </a:p>
-        </p:txBody>
-      </p:sp>
-    </p:spTree>
-    <p:extLst>
-      <p:ext uri="{BB962C8B-B14F-4D97-AF65-F5344CB8AC3E}">
-        <p14:creationId xmlns:p14="http://schemas.microsoft.com/office/powerpoint/2010/main" val="2385165672"/>
-      </p:ext>
-    </p:extLst>
-  </p:cSld>
-  <p:clrMapOvr>
-    <a:masterClrMapping/>
-  </p:clrMapOvr>
-</p:sld>
-</file>
-
 <file path=ppt/slides/slide9.xml><?xml version="1.0" encoding="utf-8"?>
 <p:sld xmlns:a="http://schemas.openxmlformats.org/drawingml/2006/main" xmlns:r="http://schemas.openxmlformats.org/officeDocument/2006/relationships" xmlns:p="http://schemas.openxmlformats.org/presentationml/2006/main">
   <p:cSld>
@@ -8265,7 +8576,7 @@
                 <a:ea typeface="Roboto Light" panose="02000000000000000000" pitchFamily="2" charset="0"/>
                 <a:cs typeface="Roboto Light" panose="02000000000000000000" pitchFamily="2" charset="0"/>
               </a:rPr>
-              <a:t>P</a:t>
+              <a:t>L</a:t>
             </a:r>
             <a:r>
               <a:rPr lang="en-US" altLang="zh-CN" dirty="0">
@@ -8273,7 +8584,7 @@
                 <a:ea typeface="Roboto Light" panose="02000000000000000000" pitchFamily="2" charset="0"/>
                 <a:cs typeface="Roboto Light" panose="02000000000000000000" pitchFamily="2" charset="0"/>
               </a:rPr>
-              <a:t>lugins</a:t>
+              <a:t>oaders</a:t>
             </a:r>
             <a:endParaRPr lang="en-US" dirty="0">
               <a:latin typeface="Roboto Light" panose="02000000000000000000" pitchFamily="2" charset="0"/>
@@ -8309,7 +8620,7 @@
     </p:spTree>
     <p:extLst>
       <p:ext uri="{BB962C8B-B14F-4D97-AF65-F5344CB8AC3E}">
-        <p14:creationId xmlns:p14="http://schemas.microsoft.com/office/powerpoint/2010/main" val="1355787398"/>
+        <p14:creationId xmlns:p14="http://schemas.microsoft.com/office/powerpoint/2010/main" val="2385165672"/>
       </p:ext>
     </p:extLst>
   </p:cSld>

</xml_diff>